<commit_message>
Revised figure 2 sizing
</commit_message>
<xml_diff>
--- a/figures/fig-2/fig-2.pptx
+++ b/figures/fig-2/fig-2.pptx
@@ -2,12 +2,12 @@
 <file path=ppt/presentation.xml><?xml version="1.0" encoding="utf-8"?>
 <p:presentation xmlns:a="http://schemas.openxmlformats.org/drawingml/2006/main" xmlns:r="http://schemas.openxmlformats.org/officeDocument/2006/relationships" xmlns:p="http://schemas.openxmlformats.org/presentationml/2006/main" saveSubsetFonts="1" autoCompressPictures="0">
   <p:sldMasterIdLst>
-    <p:sldMasterId id="2147483732" r:id="rId1"/>
+    <p:sldMasterId id="2147483756" r:id="rId1"/>
   </p:sldMasterIdLst>
   <p:sldIdLst>
-    <p:sldId id="258" r:id="rId2"/>
+    <p:sldId id="259" r:id="rId2"/>
   </p:sldIdLst>
-  <p:sldSz cx="6588125" cy="3060700"/>
+  <p:sldSz cx="6588125" cy="1709738"/>
   <p:notesSz cx="6858000" cy="9144000"/>
   <p:defaultTextStyle>
     <a:defPPr>
@@ -141,15 +141,15 @@
         </p:nvSpPr>
         <p:spPr>
           <a:xfrm>
-            <a:off x="823516" y="500906"/>
-            <a:ext cx="4941094" cy="1065577"/>
+            <a:off x="823516" y="279811"/>
+            <a:ext cx="4941094" cy="595242"/>
           </a:xfrm>
         </p:spPr>
         <p:txBody>
           <a:bodyPr anchor="b"/>
           <a:lstStyle>
             <a:lvl1pPr algn="ctr">
-              <a:defRPr sz="2678"/>
+              <a:defRPr sz="1496"/>
             </a:lvl1pPr>
           </a:lstStyle>
           <a:p>
@@ -173,8 +173,8 @@
         </p:nvSpPr>
         <p:spPr>
           <a:xfrm>
-            <a:off x="823516" y="1607576"/>
-            <a:ext cx="4941094" cy="738960"/>
+            <a:off x="823516" y="898008"/>
+            <a:ext cx="4941094" cy="412791"/>
           </a:xfrm>
         </p:spPr>
         <p:txBody>
@@ -182,39 +182,39 @@
           <a:lstStyle>
             <a:lvl1pPr marL="0" indent="0" algn="ctr">
               <a:buNone/>
-              <a:defRPr sz="1071"/>
+              <a:defRPr sz="598"/>
             </a:lvl1pPr>
-            <a:lvl2pPr marL="204048" indent="0" algn="ctr">
-              <a:buNone/>
-              <a:defRPr sz="893"/>
+            <a:lvl2pPr marL="113980" indent="0" algn="ctr">
+              <a:buNone/>
+              <a:defRPr sz="499"/>
             </a:lvl2pPr>
-            <a:lvl3pPr marL="408097" indent="0" algn="ctr">
-              <a:buNone/>
-              <a:defRPr sz="803"/>
+            <a:lvl3pPr marL="227960" indent="0" algn="ctr">
+              <a:buNone/>
+              <a:defRPr sz="449"/>
             </a:lvl3pPr>
-            <a:lvl4pPr marL="612145" indent="0" algn="ctr">
-              <a:buNone/>
-              <a:defRPr sz="714"/>
+            <a:lvl4pPr marL="341940" indent="0" algn="ctr">
+              <a:buNone/>
+              <a:defRPr sz="399"/>
             </a:lvl4pPr>
-            <a:lvl5pPr marL="816193" indent="0" algn="ctr">
-              <a:buNone/>
-              <a:defRPr sz="714"/>
+            <a:lvl5pPr marL="455920" indent="0" algn="ctr">
+              <a:buNone/>
+              <a:defRPr sz="399"/>
             </a:lvl5pPr>
-            <a:lvl6pPr marL="1020242" indent="0" algn="ctr">
-              <a:buNone/>
-              <a:defRPr sz="714"/>
+            <a:lvl6pPr marL="569900" indent="0" algn="ctr">
+              <a:buNone/>
+              <a:defRPr sz="399"/>
             </a:lvl6pPr>
-            <a:lvl7pPr marL="1224290" indent="0" algn="ctr">
-              <a:buNone/>
-              <a:defRPr sz="714"/>
+            <a:lvl7pPr marL="683880" indent="0" algn="ctr">
+              <a:buNone/>
+              <a:defRPr sz="399"/>
             </a:lvl7pPr>
-            <a:lvl8pPr marL="1428339" indent="0" algn="ctr">
-              <a:buNone/>
-              <a:defRPr sz="714"/>
+            <a:lvl8pPr marL="797860" indent="0" algn="ctr">
+              <a:buNone/>
+              <a:defRPr sz="399"/>
             </a:lvl8pPr>
-            <a:lvl9pPr marL="1632387" indent="0" algn="ctr">
-              <a:buNone/>
-              <a:defRPr sz="714"/>
+            <a:lvl9pPr marL="911840" indent="0" algn="ctr">
+              <a:buNone/>
+              <a:defRPr sz="399"/>
             </a:lvl9pPr>
           </a:lstStyle>
           <a:p>
@@ -243,7 +243,7 @@
           <a:p>
             <a:fld id="{FE14D9E9-5EC3-D444-8E38-E43C59FC4D54}" type="datetimeFigureOut">
               <a:rPr lang="en-US" smtClean="0"/>
-              <a:t>1/8/26</a:t>
+              <a:t>2/25/26</a:t>
             </a:fld>
             <a:endParaRPr lang="en-US"/>
           </a:p>
@@ -294,7 +294,7 @@
     </p:spTree>
     <p:extLst>
       <p:ext uri="{BB962C8B-B14F-4D97-AF65-F5344CB8AC3E}">
-        <p14:creationId xmlns:p14="http://schemas.microsoft.com/office/powerpoint/2010/main" val="1085091585"/>
+        <p14:creationId xmlns:p14="http://schemas.microsoft.com/office/powerpoint/2010/main" val="4103786303"/>
       </p:ext>
     </p:extLst>
   </p:cSld>
@@ -413,7 +413,7 @@
           <a:p>
             <a:fld id="{FE14D9E9-5EC3-D444-8E38-E43C59FC4D54}" type="datetimeFigureOut">
               <a:rPr lang="en-US" smtClean="0"/>
-              <a:t>1/8/26</a:t>
+              <a:t>2/25/26</a:t>
             </a:fld>
             <a:endParaRPr lang="en-US"/>
           </a:p>
@@ -464,7 +464,7 @@
     </p:spTree>
     <p:extLst>
       <p:ext uri="{BB962C8B-B14F-4D97-AF65-F5344CB8AC3E}">
-        <p14:creationId xmlns:p14="http://schemas.microsoft.com/office/powerpoint/2010/main" val="482977959"/>
+        <p14:creationId xmlns:p14="http://schemas.microsoft.com/office/powerpoint/2010/main" val="247031741"/>
       </p:ext>
     </p:extLst>
   </p:cSld>
@@ -503,8 +503,8 @@
         </p:nvSpPr>
         <p:spPr>
           <a:xfrm>
-            <a:off x="4714627" y="162954"/>
-            <a:ext cx="1420564" cy="2593802"/>
+            <a:off x="4714627" y="91028"/>
+            <a:ext cx="1420564" cy="1448924"/>
           </a:xfrm>
         </p:spPr>
         <p:txBody>
@@ -531,8 +531,8 @@
         </p:nvSpPr>
         <p:spPr>
           <a:xfrm>
-            <a:off x="452933" y="162954"/>
-            <a:ext cx="4179342" cy="2593802"/>
+            <a:off x="452933" y="91028"/>
+            <a:ext cx="4179342" cy="1448924"/>
           </a:xfrm>
         </p:spPr>
         <p:txBody>
@@ -593,7 +593,7 @@
           <a:p>
             <a:fld id="{FE14D9E9-5EC3-D444-8E38-E43C59FC4D54}" type="datetimeFigureOut">
               <a:rPr lang="en-US" smtClean="0"/>
-              <a:t>1/8/26</a:t>
+              <a:t>2/25/26</a:t>
             </a:fld>
             <a:endParaRPr lang="en-US"/>
           </a:p>
@@ -644,7 +644,7 @@
     </p:spTree>
     <p:extLst>
       <p:ext uri="{BB962C8B-B14F-4D97-AF65-F5344CB8AC3E}">
-        <p14:creationId xmlns:p14="http://schemas.microsoft.com/office/powerpoint/2010/main" val="2705233456"/>
+        <p14:creationId xmlns:p14="http://schemas.microsoft.com/office/powerpoint/2010/main" val="1338509166"/>
       </p:ext>
     </p:extLst>
   </p:cSld>
@@ -763,7 +763,7 @@
           <a:p>
             <a:fld id="{FE14D9E9-5EC3-D444-8E38-E43C59FC4D54}" type="datetimeFigureOut">
               <a:rPr lang="en-US" smtClean="0"/>
-              <a:t>1/8/26</a:t>
+              <a:t>2/25/26</a:t>
             </a:fld>
             <a:endParaRPr lang="en-US"/>
           </a:p>
@@ -814,7 +814,7 @@
     </p:spTree>
     <p:extLst>
       <p:ext uri="{BB962C8B-B14F-4D97-AF65-F5344CB8AC3E}">
-        <p14:creationId xmlns:p14="http://schemas.microsoft.com/office/powerpoint/2010/main" val="211638952"/>
+        <p14:creationId xmlns:p14="http://schemas.microsoft.com/office/powerpoint/2010/main" val="3378176336"/>
       </p:ext>
     </p:extLst>
   </p:cSld>
@@ -853,15 +853,15 @@
         </p:nvSpPr>
         <p:spPr>
           <a:xfrm>
-            <a:off x="449502" y="763050"/>
-            <a:ext cx="5682258" cy="1273166"/>
+            <a:off x="449502" y="426248"/>
+            <a:ext cx="5682258" cy="711203"/>
           </a:xfrm>
         </p:spPr>
         <p:txBody>
           <a:bodyPr anchor="b"/>
           <a:lstStyle>
             <a:lvl1pPr>
-              <a:defRPr sz="2678"/>
+              <a:defRPr sz="1496"/>
             </a:lvl1pPr>
           </a:lstStyle>
           <a:p>
@@ -885,8 +885,8 @@
         </p:nvSpPr>
         <p:spPr>
           <a:xfrm>
-            <a:off x="449502" y="2048261"/>
-            <a:ext cx="5682258" cy="669528"/>
+            <a:off x="449502" y="1144179"/>
+            <a:ext cx="5682258" cy="374005"/>
           </a:xfrm>
         </p:spPr>
         <p:txBody>
@@ -894,7 +894,7 @@
           <a:lstStyle>
             <a:lvl1pPr marL="0" indent="0">
               <a:buNone/>
-              <a:defRPr sz="1071">
+              <a:defRPr sz="598">
                 <a:solidFill>
                   <a:schemeClr val="tx1">
                     <a:tint val="75000"/>
@@ -902,9 +902,9 @@
                 </a:solidFill>
               </a:defRPr>
             </a:lvl1pPr>
-            <a:lvl2pPr marL="204048" indent="0">
-              <a:buNone/>
-              <a:defRPr sz="893">
+            <a:lvl2pPr marL="113980" indent="0">
+              <a:buNone/>
+              <a:defRPr sz="499">
                 <a:solidFill>
                   <a:schemeClr val="tx1">
                     <a:tint val="75000"/>
@@ -912,9 +912,9 @@
                 </a:solidFill>
               </a:defRPr>
             </a:lvl2pPr>
-            <a:lvl3pPr marL="408097" indent="0">
-              <a:buNone/>
-              <a:defRPr sz="803">
+            <a:lvl3pPr marL="227960" indent="0">
+              <a:buNone/>
+              <a:defRPr sz="449">
                 <a:solidFill>
                   <a:schemeClr val="tx1">
                     <a:tint val="75000"/>
@@ -922,9 +922,9 @@
                 </a:solidFill>
               </a:defRPr>
             </a:lvl3pPr>
-            <a:lvl4pPr marL="612145" indent="0">
-              <a:buNone/>
-              <a:defRPr sz="714">
+            <a:lvl4pPr marL="341940" indent="0">
+              <a:buNone/>
+              <a:defRPr sz="399">
                 <a:solidFill>
                   <a:schemeClr val="tx1">
                     <a:tint val="75000"/>
@@ -932,9 +932,9 @@
                 </a:solidFill>
               </a:defRPr>
             </a:lvl4pPr>
-            <a:lvl5pPr marL="816193" indent="0">
-              <a:buNone/>
-              <a:defRPr sz="714">
+            <a:lvl5pPr marL="455920" indent="0">
+              <a:buNone/>
+              <a:defRPr sz="399">
                 <a:solidFill>
                   <a:schemeClr val="tx1">
                     <a:tint val="75000"/>
@@ -942,9 +942,9 @@
                 </a:solidFill>
               </a:defRPr>
             </a:lvl5pPr>
-            <a:lvl6pPr marL="1020242" indent="0">
-              <a:buNone/>
-              <a:defRPr sz="714">
+            <a:lvl6pPr marL="569900" indent="0">
+              <a:buNone/>
+              <a:defRPr sz="399">
                 <a:solidFill>
                   <a:schemeClr val="tx1">
                     <a:tint val="75000"/>
@@ -952,9 +952,9 @@
                 </a:solidFill>
               </a:defRPr>
             </a:lvl6pPr>
-            <a:lvl7pPr marL="1224290" indent="0">
-              <a:buNone/>
-              <a:defRPr sz="714">
+            <a:lvl7pPr marL="683880" indent="0">
+              <a:buNone/>
+              <a:defRPr sz="399">
                 <a:solidFill>
                   <a:schemeClr val="tx1">
                     <a:tint val="75000"/>
@@ -962,9 +962,9 @@
                 </a:solidFill>
               </a:defRPr>
             </a:lvl7pPr>
-            <a:lvl8pPr marL="1428339" indent="0">
-              <a:buNone/>
-              <a:defRPr sz="714">
+            <a:lvl8pPr marL="797860" indent="0">
+              <a:buNone/>
+              <a:defRPr sz="399">
                 <a:solidFill>
                   <a:schemeClr val="tx1">
                     <a:tint val="75000"/>
@@ -972,9 +972,9 @@
                 </a:solidFill>
               </a:defRPr>
             </a:lvl8pPr>
-            <a:lvl9pPr marL="1632387" indent="0">
-              <a:buNone/>
-              <a:defRPr sz="714">
+            <a:lvl9pPr marL="911840" indent="0">
+              <a:buNone/>
+              <a:defRPr sz="399">
                 <a:solidFill>
                   <a:schemeClr val="tx1">
                     <a:tint val="75000"/>
@@ -1009,7 +1009,7 @@
           <a:p>
             <a:fld id="{FE14D9E9-5EC3-D444-8E38-E43C59FC4D54}" type="datetimeFigureOut">
               <a:rPr lang="en-US" smtClean="0"/>
-              <a:t>1/8/26</a:t>
+              <a:t>2/25/26</a:t>
             </a:fld>
             <a:endParaRPr lang="en-US"/>
           </a:p>
@@ -1060,7 +1060,7 @@
     </p:spTree>
     <p:extLst>
       <p:ext uri="{BB962C8B-B14F-4D97-AF65-F5344CB8AC3E}">
-        <p14:creationId xmlns:p14="http://schemas.microsoft.com/office/powerpoint/2010/main" val="3401623829"/>
+        <p14:creationId xmlns:p14="http://schemas.microsoft.com/office/powerpoint/2010/main" val="1452711157"/>
       </p:ext>
     </p:extLst>
   </p:cSld>
@@ -1122,8 +1122,8 @@
         </p:nvSpPr>
         <p:spPr>
           <a:xfrm>
-            <a:off x="452934" y="814770"/>
-            <a:ext cx="2799953" cy="1941986"/>
+            <a:off x="452934" y="455139"/>
+            <a:ext cx="2799953" cy="1084813"/>
           </a:xfrm>
         </p:spPr>
         <p:txBody>
@@ -1179,8 +1179,8 @@
         </p:nvSpPr>
         <p:spPr>
           <a:xfrm>
-            <a:off x="3335238" y="814770"/>
-            <a:ext cx="2799953" cy="1941986"/>
+            <a:off x="3335238" y="455139"/>
+            <a:ext cx="2799953" cy="1084813"/>
           </a:xfrm>
         </p:spPr>
         <p:txBody>
@@ -1241,7 +1241,7 @@
           <a:p>
             <a:fld id="{FE14D9E9-5EC3-D444-8E38-E43C59FC4D54}" type="datetimeFigureOut">
               <a:rPr lang="en-US" smtClean="0"/>
-              <a:t>1/8/26</a:t>
+              <a:t>2/25/26</a:t>
             </a:fld>
             <a:endParaRPr lang="en-US"/>
           </a:p>
@@ -1292,7 +1292,7 @@
     </p:spTree>
     <p:extLst>
       <p:ext uri="{BB962C8B-B14F-4D97-AF65-F5344CB8AC3E}">
-        <p14:creationId xmlns:p14="http://schemas.microsoft.com/office/powerpoint/2010/main" val="506090818"/>
+        <p14:creationId xmlns:p14="http://schemas.microsoft.com/office/powerpoint/2010/main" val="2432031251"/>
       </p:ext>
     </p:extLst>
   </p:cSld>
@@ -1331,8 +1331,8 @@
         </p:nvSpPr>
         <p:spPr>
           <a:xfrm>
-            <a:off x="453792" y="162954"/>
-            <a:ext cx="5682258" cy="591594"/>
+            <a:off x="453792" y="91028"/>
+            <a:ext cx="5682258" cy="330470"/>
           </a:xfrm>
         </p:spPr>
         <p:txBody>
@@ -1359,8 +1359,8 @@
         </p:nvSpPr>
         <p:spPr>
           <a:xfrm>
-            <a:off x="453792" y="750297"/>
-            <a:ext cx="2787085" cy="367709"/>
+            <a:off x="453792" y="419123"/>
+            <a:ext cx="2787085" cy="205406"/>
           </a:xfrm>
         </p:spPr>
         <p:txBody>
@@ -1368,39 +1368,39 @@
           <a:lstStyle>
             <a:lvl1pPr marL="0" indent="0">
               <a:buNone/>
-              <a:defRPr sz="1071" b="1"/>
+              <a:defRPr sz="598" b="1"/>
             </a:lvl1pPr>
-            <a:lvl2pPr marL="204048" indent="0">
-              <a:buNone/>
-              <a:defRPr sz="893" b="1"/>
+            <a:lvl2pPr marL="113980" indent="0">
+              <a:buNone/>
+              <a:defRPr sz="499" b="1"/>
             </a:lvl2pPr>
-            <a:lvl3pPr marL="408097" indent="0">
-              <a:buNone/>
-              <a:defRPr sz="803" b="1"/>
+            <a:lvl3pPr marL="227960" indent="0">
+              <a:buNone/>
+              <a:defRPr sz="449" b="1"/>
             </a:lvl3pPr>
-            <a:lvl4pPr marL="612145" indent="0">
-              <a:buNone/>
-              <a:defRPr sz="714" b="1"/>
+            <a:lvl4pPr marL="341940" indent="0">
+              <a:buNone/>
+              <a:defRPr sz="399" b="1"/>
             </a:lvl4pPr>
-            <a:lvl5pPr marL="816193" indent="0">
-              <a:buNone/>
-              <a:defRPr sz="714" b="1"/>
+            <a:lvl5pPr marL="455920" indent="0">
+              <a:buNone/>
+              <a:defRPr sz="399" b="1"/>
             </a:lvl5pPr>
-            <a:lvl6pPr marL="1020242" indent="0">
-              <a:buNone/>
-              <a:defRPr sz="714" b="1"/>
+            <a:lvl6pPr marL="569900" indent="0">
+              <a:buNone/>
+              <a:defRPr sz="399" b="1"/>
             </a:lvl6pPr>
-            <a:lvl7pPr marL="1224290" indent="0">
-              <a:buNone/>
-              <a:defRPr sz="714" b="1"/>
+            <a:lvl7pPr marL="683880" indent="0">
+              <a:buNone/>
+              <a:defRPr sz="399" b="1"/>
             </a:lvl7pPr>
-            <a:lvl8pPr marL="1428339" indent="0">
-              <a:buNone/>
-              <a:defRPr sz="714" b="1"/>
+            <a:lvl8pPr marL="797860" indent="0">
+              <a:buNone/>
+              <a:defRPr sz="399" b="1"/>
             </a:lvl8pPr>
-            <a:lvl9pPr marL="1632387" indent="0">
-              <a:buNone/>
-              <a:defRPr sz="714" b="1"/>
+            <a:lvl9pPr marL="911840" indent="0">
+              <a:buNone/>
+              <a:defRPr sz="399" b="1"/>
             </a:lvl9pPr>
           </a:lstStyle>
           <a:p>
@@ -1424,8 +1424,8 @@
         </p:nvSpPr>
         <p:spPr>
           <a:xfrm>
-            <a:off x="453792" y="1118006"/>
-            <a:ext cx="2787085" cy="1644418"/>
+            <a:off x="453792" y="624529"/>
+            <a:ext cx="2787085" cy="918589"/>
           </a:xfrm>
         </p:spPr>
         <p:txBody>
@@ -1481,8 +1481,8 @@
         </p:nvSpPr>
         <p:spPr>
           <a:xfrm>
-            <a:off x="3335238" y="750297"/>
-            <a:ext cx="2800811" cy="367709"/>
+            <a:off x="3335238" y="419123"/>
+            <a:ext cx="2800811" cy="205406"/>
           </a:xfrm>
         </p:spPr>
         <p:txBody>
@@ -1490,39 +1490,39 @@
           <a:lstStyle>
             <a:lvl1pPr marL="0" indent="0">
               <a:buNone/>
-              <a:defRPr sz="1071" b="1"/>
+              <a:defRPr sz="598" b="1"/>
             </a:lvl1pPr>
-            <a:lvl2pPr marL="204048" indent="0">
-              <a:buNone/>
-              <a:defRPr sz="893" b="1"/>
+            <a:lvl2pPr marL="113980" indent="0">
+              <a:buNone/>
+              <a:defRPr sz="499" b="1"/>
             </a:lvl2pPr>
-            <a:lvl3pPr marL="408097" indent="0">
-              <a:buNone/>
-              <a:defRPr sz="803" b="1"/>
+            <a:lvl3pPr marL="227960" indent="0">
+              <a:buNone/>
+              <a:defRPr sz="449" b="1"/>
             </a:lvl3pPr>
-            <a:lvl4pPr marL="612145" indent="0">
-              <a:buNone/>
-              <a:defRPr sz="714" b="1"/>
+            <a:lvl4pPr marL="341940" indent="0">
+              <a:buNone/>
+              <a:defRPr sz="399" b="1"/>
             </a:lvl4pPr>
-            <a:lvl5pPr marL="816193" indent="0">
-              <a:buNone/>
-              <a:defRPr sz="714" b="1"/>
+            <a:lvl5pPr marL="455920" indent="0">
+              <a:buNone/>
+              <a:defRPr sz="399" b="1"/>
             </a:lvl5pPr>
-            <a:lvl6pPr marL="1020242" indent="0">
-              <a:buNone/>
-              <a:defRPr sz="714" b="1"/>
+            <a:lvl6pPr marL="569900" indent="0">
+              <a:buNone/>
+              <a:defRPr sz="399" b="1"/>
             </a:lvl6pPr>
-            <a:lvl7pPr marL="1224290" indent="0">
-              <a:buNone/>
-              <a:defRPr sz="714" b="1"/>
+            <a:lvl7pPr marL="683880" indent="0">
+              <a:buNone/>
+              <a:defRPr sz="399" b="1"/>
             </a:lvl7pPr>
-            <a:lvl8pPr marL="1428339" indent="0">
-              <a:buNone/>
-              <a:defRPr sz="714" b="1"/>
+            <a:lvl8pPr marL="797860" indent="0">
+              <a:buNone/>
+              <a:defRPr sz="399" b="1"/>
             </a:lvl8pPr>
-            <a:lvl9pPr marL="1632387" indent="0">
-              <a:buNone/>
-              <a:defRPr sz="714" b="1"/>
+            <a:lvl9pPr marL="911840" indent="0">
+              <a:buNone/>
+              <a:defRPr sz="399" b="1"/>
             </a:lvl9pPr>
           </a:lstStyle>
           <a:p>
@@ -1546,8 +1546,8 @@
         </p:nvSpPr>
         <p:spPr>
           <a:xfrm>
-            <a:off x="3335238" y="1118006"/>
-            <a:ext cx="2800811" cy="1644418"/>
+            <a:off x="3335238" y="624529"/>
+            <a:ext cx="2800811" cy="918589"/>
           </a:xfrm>
         </p:spPr>
         <p:txBody>
@@ -1608,7 +1608,7 @@
           <a:p>
             <a:fld id="{FE14D9E9-5EC3-D444-8E38-E43C59FC4D54}" type="datetimeFigureOut">
               <a:rPr lang="en-US" smtClean="0"/>
-              <a:t>1/8/26</a:t>
+              <a:t>2/25/26</a:t>
             </a:fld>
             <a:endParaRPr lang="en-US"/>
           </a:p>
@@ -1659,7 +1659,7 @@
     </p:spTree>
     <p:extLst>
       <p:ext uri="{BB962C8B-B14F-4D97-AF65-F5344CB8AC3E}">
-        <p14:creationId xmlns:p14="http://schemas.microsoft.com/office/powerpoint/2010/main" val="1239350584"/>
+        <p14:creationId xmlns:p14="http://schemas.microsoft.com/office/powerpoint/2010/main" val="2236431556"/>
       </p:ext>
     </p:extLst>
   </p:cSld>
@@ -1726,7 +1726,7 @@
           <a:p>
             <a:fld id="{FE14D9E9-5EC3-D444-8E38-E43C59FC4D54}" type="datetimeFigureOut">
               <a:rPr lang="en-US" smtClean="0"/>
-              <a:t>1/8/26</a:t>
+              <a:t>2/25/26</a:t>
             </a:fld>
             <a:endParaRPr lang="en-US"/>
           </a:p>
@@ -1777,7 +1777,7 @@
     </p:spTree>
     <p:extLst>
       <p:ext uri="{BB962C8B-B14F-4D97-AF65-F5344CB8AC3E}">
-        <p14:creationId xmlns:p14="http://schemas.microsoft.com/office/powerpoint/2010/main" val="3524090776"/>
+        <p14:creationId xmlns:p14="http://schemas.microsoft.com/office/powerpoint/2010/main" val="886326306"/>
       </p:ext>
     </p:extLst>
   </p:cSld>
@@ -1821,7 +1821,7 @@
           <a:p>
             <a:fld id="{FE14D9E9-5EC3-D444-8E38-E43C59FC4D54}" type="datetimeFigureOut">
               <a:rPr lang="en-US" smtClean="0"/>
-              <a:t>1/8/26</a:t>
+              <a:t>2/25/26</a:t>
             </a:fld>
             <a:endParaRPr lang="en-US"/>
           </a:p>
@@ -1872,7 +1872,7 @@
     </p:spTree>
     <p:extLst>
       <p:ext uri="{BB962C8B-B14F-4D97-AF65-F5344CB8AC3E}">
-        <p14:creationId xmlns:p14="http://schemas.microsoft.com/office/powerpoint/2010/main" val="93839003"/>
+        <p14:creationId xmlns:p14="http://schemas.microsoft.com/office/powerpoint/2010/main" val="2917057414"/>
       </p:ext>
     </p:extLst>
   </p:cSld>
@@ -1911,15 +1911,15 @@
         </p:nvSpPr>
         <p:spPr>
           <a:xfrm>
-            <a:off x="453792" y="204047"/>
-            <a:ext cx="2124842" cy="714163"/>
+            <a:off x="453792" y="113982"/>
+            <a:ext cx="2124842" cy="398939"/>
           </a:xfrm>
         </p:spPr>
         <p:txBody>
           <a:bodyPr anchor="b"/>
           <a:lstStyle>
             <a:lvl1pPr>
-              <a:defRPr sz="1428"/>
+              <a:defRPr sz="798"/>
             </a:lvl1pPr>
           </a:lstStyle>
           <a:p>
@@ -1943,39 +1943,39 @@
         </p:nvSpPr>
         <p:spPr>
           <a:xfrm>
-            <a:off x="2800811" y="440684"/>
-            <a:ext cx="3335238" cy="2175081"/>
+            <a:off x="2800811" y="246171"/>
+            <a:ext cx="3335238" cy="1215022"/>
           </a:xfrm>
         </p:spPr>
         <p:txBody>
           <a:bodyPr/>
           <a:lstStyle>
             <a:lvl1pPr>
-              <a:defRPr sz="1428"/>
+              <a:defRPr sz="798"/>
             </a:lvl1pPr>
             <a:lvl2pPr>
-              <a:defRPr sz="1250"/>
+              <a:defRPr sz="698"/>
             </a:lvl2pPr>
             <a:lvl3pPr>
-              <a:defRPr sz="1071"/>
+              <a:defRPr sz="598"/>
             </a:lvl3pPr>
             <a:lvl4pPr>
-              <a:defRPr sz="893"/>
+              <a:defRPr sz="499"/>
             </a:lvl4pPr>
             <a:lvl5pPr>
-              <a:defRPr sz="893"/>
+              <a:defRPr sz="499"/>
             </a:lvl5pPr>
             <a:lvl6pPr>
-              <a:defRPr sz="893"/>
+              <a:defRPr sz="499"/>
             </a:lvl6pPr>
             <a:lvl7pPr>
-              <a:defRPr sz="893"/>
+              <a:defRPr sz="499"/>
             </a:lvl7pPr>
             <a:lvl8pPr>
-              <a:defRPr sz="893"/>
+              <a:defRPr sz="499"/>
             </a:lvl8pPr>
             <a:lvl9pPr>
-              <a:defRPr sz="893"/>
+              <a:defRPr sz="499"/>
             </a:lvl9pPr>
           </a:lstStyle>
           <a:p>
@@ -2028,8 +2028,8 @@
         </p:nvSpPr>
         <p:spPr>
           <a:xfrm>
-            <a:off x="453792" y="918210"/>
-            <a:ext cx="2124842" cy="1701098"/>
+            <a:off x="453792" y="512922"/>
+            <a:ext cx="2124842" cy="950250"/>
           </a:xfrm>
         </p:spPr>
         <p:txBody>
@@ -2037,39 +2037,39 @@
           <a:lstStyle>
             <a:lvl1pPr marL="0" indent="0">
               <a:buNone/>
-              <a:defRPr sz="714"/>
+              <a:defRPr sz="399"/>
             </a:lvl1pPr>
-            <a:lvl2pPr marL="204048" indent="0">
-              <a:buNone/>
-              <a:defRPr sz="625"/>
+            <a:lvl2pPr marL="113980" indent="0">
+              <a:buNone/>
+              <a:defRPr sz="349"/>
             </a:lvl2pPr>
-            <a:lvl3pPr marL="408097" indent="0">
-              <a:buNone/>
-              <a:defRPr sz="536"/>
+            <a:lvl3pPr marL="227960" indent="0">
+              <a:buNone/>
+              <a:defRPr sz="299"/>
             </a:lvl3pPr>
-            <a:lvl4pPr marL="612145" indent="0">
-              <a:buNone/>
-              <a:defRPr sz="446"/>
+            <a:lvl4pPr marL="341940" indent="0">
+              <a:buNone/>
+              <a:defRPr sz="249"/>
             </a:lvl4pPr>
-            <a:lvl5pPr marL="816193" indent="0">
-              <a:buNone/>
-              <a:defRPr sz="446"/>
+            <a:lvl5pPr marL="455920" indent="0">
+              <a:buNone/>
+              <a:defRPr sz="249"/>
             </a:lvl5pPr>
-            <a:lvl6pPr marL="1020242" indent="0">
-              <a:buNone/>
-              <a:defRPr sz="446"/>
+            <a:lvl6pPr marL="569900" indent="0">
+              <a:buNone/>
+              <a:defRPr sz="249"/>
             </a:lvl6pPr>
-            <a:lvl7pPr marL="1224290" indent="0">
-              <a:buNone/>
-              <a:defRPr sz="446"/>
+            <a:lvl7pPr marL="683880" indent="0">
+              <a:buNone/>
+              <a:defRPr sz="249"/>
             </a:lvl7pPr>
-            <a:lvl8pPr marL="1428339" indent="0">
-              <a:buNone/>
-              <a:defRPr sz="446"/>
+            <a:lvl8pPr marL="797860" indent="0">
+              <a:buNone/>
+              <a:defRPr sz="249"/>
             </a:lvl8pPr>
-            <a:lvl9pPr marL="1632387" indent="0">
-              <a:buNone/>
-              <a:defRPr sz="446"/>
+            <a:lvl9pPr marL="911840" indent="0">
+              <a:buNone/>
+              <a:defRPr sz="249"/>
             </a:lvl9pPr>
           </a:lstStyle>
           <a:p>
@@ -2098,7 +2098,7 @@
           <a:p>
             <a:fld id="{FE14D9E9-5EC3-D444-8E38-E43C59FC4D54}" type="datetimeFigureOut">
               <a:rPr lang="en-US" smtClean="0"/>
-              <a:t>1/8/26</a:t>
+              <a:t>2/25/26</a:t>
             </a:fld>
             <a:endParaRPr lang="en-US"/>
           </a:p>
@@ -2149,7 +2149,7 @@
     </p:spTree>
     <p:extLst>
       <p:ext uri="{BB962C8B-B14F-4D97-AF65-F5344CB8AC3E}">
-        <p14:creationId xmlns:p14="http://schemas.microsoft.com/office/powerpoint/2010/main" val="3907883435"/>
+        <p14:creationId xmlns:p14="http://schemas.microsoft.com/office/powerpoint/2010/main" val="104320625"/>
       </p:ext>
     </p:extLst>
   </p:cSld>
@@ -2188,15 +2188,15 @@
         </p:nvSpPr>
         <p:spPr>
           <a:xfrm>
-            <a:off x="453792" y="204047"/>
-            <a:ext cx="2124842" cy="714163"/>
+            <a:off x="453792" y="113982"/>
+            <a:ext cx="2124842" cy="398939"/>
           </a:xfrm>
         </p:spPr>
         <p:txBody>
           <a:bodyPr anchor="b"/>
           <a:lstStyle>
             <a:lvl1pPr>
-              <a:defRPr sz="1428"/>
+              <a:defRPr sz="798"/>
             </a:lvl1pPr>
           </a:lstStyle>
           <a:p>
@@ -2220,8 +2220,8 @@
         </p:nvSpPr>
         <p:spPr>
           <a:xfrm>
-            <a:off x="2800811" y="440684"/>
-            <a:ext cx="3335238" cy="2175081"/>
+            <a:off x="2800811" y="246171"/>
+            <a:ext cx="3335238" cy="1215022"/>
           </a:xfrm>
         </p:spPr>
         <p:txBody>
@@ -2229,39 +2229,39 @@
           <a:lstStyle>
             <a:lvl1pPr marL="0" indent="0">
               <a:buNone/>
-              <a:defRPr sz="1428"/>
+              <a:defRPr sz="798"/>
             </a:lvl1pPr>
-            <a:lvl2pPr marL="204048" indent="0">
-              <a:buNone/>
-              <a:defRPr sz="1250"/>
+            <a:lvl2pPr marL="113980" indent="0">
+              <a:buNone/>
+              <a:defRPr sz="698"/>
             </a:lvl2pPr>
-            <a:lvl3pPr marL="408097" indent="0">
-              <a:buNone/>
-              <a:defRPr sz="1071"/>
+            <a:lvl3pPr marL="227960" indent="0">
+              <a:buNone/>
+              <a:defRPr sz="598"/>
             </a:lvl3pPr>
-            <a:lvl4pPr marL="612145" indent="0">
-              <a:buNone/>
-              <a:defRPr sz="893"/>
+            <a:lvl4pPr marL="341940" indent="0">
+              <a:buNone/>
+              <a:defRPr sz="499"/>
             </a:lvl4pPr>
-            <a:lvl5pPr marL="816193" indent="0">
-              <a:buNone/>
-              <a:defRPr sz="893"/>
+            <a:lvl5pPr marL="455920" indent="0">
+              <a:buNone/>
+              <a:defRPr sz="499"/>
             </a:lvl5pPr>
-            <a:lvl6pPr marL="1020242" indent="0">
-              <a:buNone/>
-              <a:defRPr sz="893"/>
+            <a:lvl6pPr marL="569900" indent="0">
+              <a:buNone/>
+              <a:defRPr sz="499"/>
             </a:lvl6pPr>
-            <a:lvl7pPr marL="1224290" indent="0">
-              <a:buNone/>
-              <a:defRPr sz="893"/>
+            <a:lvl7pPr marL="683880" indent="0">
+              <a:buNone/>
+              <a:defRPr sz="499"/>
             </a:lvl7pPr>
-            <a:lvl8pPr marL="1428339" indent="0">
-              <a:buNone/>
-              <a:defRPr sz="893"/>
+            <a:lvl8pPr marL="797860" indent="0">
+              <a:buNone/>
+              <a:defRPr sz="499"/>
             </a:lvl8pPr>
-            <a:lvl9pPr marL="1632387" indent="0">
-              <a:buNone/>
-              <a:defRPr sz="893"/>
+            <a:lvl9pPr marL="911840" indent="0">
+              <a:buNone/>
+              <a:defRPr sz="499"/>
             </a:lvl9pPr>
           </a:lstStyle>
           <a:p>
@@ -2285,8 +2285,8 @@
         </p:nvSpPr>
         <p:spPr>
           <a:xfrm>
-            <a:off x="453792" y="918210"/>
-            <a:ext cx="2124842" cy="1701098"/>
+            <a:off x="453792" y="512922"/>
+            <a:ext cx="2124842" cy="950250"/>
           </a:xfrm>
         </p:spPr>
         <p:txBody>
@@ -2294,39 +2294,39 @@
           <a:lstStyle>
             <a:lvl1pPr marL="0" indent="0">
               <a:buNone/>
-              <a:defRPr sz="714"/>
+              <a:defRPr sz="399"/>
             </a:lvl1pPr>
-            <a:lvl2pPr marL="204048" indent="0">
-              <a:buNone/>
-              <a:defRPr sz="625"/>
+            <a:lvl2pPr marL="113980" indent="0">
+              <a:buNone/>
+              <a:defRPr sz="349"/>
             </a:lvl2pPr>
-            <a:lvl3pPr marL="408097" indent="0">
-              <a:buNone/>
-              <a:defRPr sz="536"/>
+            <a:lvl3pPr marL="227960" indent="0">
+              <a:buNone/>
+              <a:defRPr sz="299"/>
             </a:lvl3pPr>
-            <a:lvl4pPr marL="612145" indent="0">
-              <a:buNone/>
-              <a:defRPr sz="446"/>
+            <a:lvl4pPr marL="341940" indent="0">
+              <a:buNone/>
+              <a:defRPr sz="249"/>
             </a:lvl4pPr>
-            <a:lvl5pPr marL="816193" indent="0">
-              <a:buNone/>
-              <a:defRPr sz="446"/>
+            <a:lvl5pPr marL="455920" indent="0">
+              <a:buNone/>
+              <a:defRPr sz="249"/>
             </a:lvl5pPr>
-            <a:lvl6pPr marL="1020242" indent="0">
-              <a:buNone/>
-              <a:defRPr sz="446"/>
+            <a:lvl6pPr marL="569900" indent="0">
+              <a:buNone/>
+              <a:defRPr sz="249"/>
             </a:lvl6pPr>
-            <a:lvl7pPr marL="1224290" indent="0">
-              <a:buNone/>
-              <a:defRPr sz="446"/>
+            <a:lvl7pPr marL="683880" indent="0">
+              <a:buNone/>
+              <a:defRPr sz="249"/>
             </a:lvl7pPr>
-            <a:lvl8pPr marL="1428339" indent="0">
-              <a:buNone/>
-              <a:defRPr sz="446"/>
+            <a:lvl8pPr marL="797860" indent="0">
+              <a:buNone/>
+              <a:defRPr sz="249"/>
             </a:lvl8pPr>
-            <a:lvl9pPr marL="1632387" indent="0">
-              <a:buNone/>
-              <a:defRPr sz="446"/>
+            <a:lvl9pPr marL="911840" indent="0">
+              <a:buNone/>
+              <a:defRPr sz="249"/>
             </a:lvl9pPr>
           </a:lstStyle>
           <a:p>
@@ -2355,7 +2355,7 @@
           <a:p>
             <a:fld id="{FE14D9E9-5EC3-D444-8E38-E43C59FC4D54}" type="datetimeFigureOut">
               <a:rPr lang="en-US" smtClean="0"/>
-              <a:t>1/8/26</a:t>
+              <a:t>2/25/26</a:t>
             </a:fld>
             <a:endParaRPr lang="en-US"/>
           </a:p>
@@ -2406,7 +2406,7 @@
     </p:spTree>
     <p:extLst>
       <p:ext uri="{BB962C8B-B14F-4D97-AF65-F5344CB8AC3E}">
-        <p14:creationId xmlns:p14="http://schemas.microsoft.com/office/powerpoint/2010/main" val="1755823202"/>
+        <p14:creationId xmlns:p14="http://schemas.microsoft.com/office/powerpoint/2010/main" val="2266947635"/>
       </p:ext>
     </p:extLst>
   </p:cSld>
@@ -2450,8 +2450,8 @@
         </p:nvSpPr>
         <p:spPr>
           <a:xfrm>
-            <a:off x="452934" y="162954"/>
-            <a:ext cx="5682258" cy="591594"/>
+            <a:off x="452934" y="91028"/>
+            <a:ext cx="5682258" cy="330470"/>
           </a:xfrm>
           <a:prstGeom prst="rect">
             <a:avLst/>
@@ -2483,8 +2483,8 @@
         </p:nvSpPr>
         <p:spPr>
           <a:xfrm>
-            <a:off x="452934" y="814770"/>
-            <a:ext cx="5682258" cy="1941986"/>
+            <a:off x="452934" y="455139"/>
+            <a:ext cx="5682258" cy="1084813"/>
           </a:xfrm>
           <a:prstGeom prst="rect">
             <a:avLst/>
@@ -2545,8 +2545,8 @@
         </p:nvSpPr>
         <p:spPr>
           <a:xfrm>
-            <a:off x="452934" y="2836816"/>
-            <a:ext cx="1482328" cy="162954"/>
+            <a:off x="452934" y="1584674"/>
+            <a:ext cx="1482328" cy="91028"/>
           </a:xfrm>
           <a:prstGeom prst="rect">
             <a:avLst/>
@@ -2556,7 +2556,7 @@
           <a:bodyPr vert="horz" lIns="91440" tIns="45720" rIns="91440" bIns="45720" rtlCol="0" anchor="ctr"/>
           <a:lstStyle>
             <a:lvl1pPr algn="l">
-              <a:defRPr sz="536">
+              <a:defRPr sz="299">
                 <a:solidFill>
                   <a:schemeClr val="tx1">
                     <a:tint val="75000"/>
@@ -2568,7 +2568,7 @@
           <a:p>
             <a:fld id="{FE14D9E9-5EC3-D444-8E38-E43C59FC4D54}" type="datetimeFigureOut">
               <a:rPr lang="en-US" smtClean="0"/>
-              <a:t>1/8/26</a:t>
+              <a:t>2/25/26</a:t>
             </a:fld>
             <a:endParaRPr lang="en-US"/>
           </a:p>
@@ -2586,8 +2586,8 @@
         </p:nvSpPr>
         <p:spPr>
           <a:xfrm>
-            <a:off x="2182317" y="2836816"/>
-            <a:ext cx="2223492" cy="162954"/>
+            <a:off x="2182317" y="1584674"/>
+            <a:ext cx="2223492" cy="91028"/>
           </a:xfrm>
           <a:prstGeom prst="rect">
             <a:avLst/>
@@ -2597,7 +2597,7 @@
           <a:bodyPr vert="horz" lIns="91440" tIns="45720" rIns="91440" bIns="45720" rtlCol="0" anchor="ctr"/>
           <a:lstStyle>
             <a:lvl1pPr algn="ctr">
-              <a:defRPr sz="536">
+              <a:defRPr sz="299">
                 <a:solidFill>
                   <a:schemeClr val="tx1">
                     <a:tint val="75000"/>
@@ -2623,8 +2623,8 @@
         </p:nvSpPr>
         <p:spPr>
           <a:xfrm>
-            <a:off x="4652863" y="2836816"/>
-            <a:ext cx="1482328" cy="162954"/>
+            <a:off x="4652863" y="1584674"/>
+            <a:ext cx="1482328" cy="91028"/>
           </a:xfrm>
           <a:prstGeom prst="rect">
             <a:avLst/>
@@ -2634,7 +2634,7 @@
           <a:bodyPr vert="horz" lIns="91440" tIns="45720" rIns="91440" bIns="45720" rtlCol="0" anchor="ctr"/>
           <a:lstStyle>
             <a:lvl1pPr algn="r">
-              <a:defRPr sz="536">
+              <a:defRPr sz="299">
                 <a:solidFill>
                   <a:schemeClr val="tx1">
                     <a:tint val="75000"/>
@@ -2655,27 +2655,27 @@
     </p:spTree>
     <p:extLst>
       <p:ext uri="{BB962C8B-B14F-4D97-AF65-F5344CB8AC3E}">
-        <p14:creationId xmlns:p14="http://schemas.microsoft.com/office/powerpoint/2010/main" val="4274204387"/>
+        <p14:creationId xmlns:p14="http://schemas.microsoft.com/office/powerpoint/2010/main" val="2812440953"/>
       </p:ext>
     </p:extLst>
   </p:cSld>
   <p:clrMap bg1="lt1" tx1="dk1" bg2="lt2" tx2="dk2" accent1="accent1" accent2="accent2" accent3="accent3" accent4="accent4" accent5="accent5" accent6="accent6" hlink="hlink" folHlink="folHlink"/>
   <p:sldLayoutIdLst>
-    <p:sldLayoutId id="2147483733" r:id="rId1"/>
-    <p:sldLayoutId id="2147483734" r:id="rId2"/>
-    <p:sldLayoutId id="2147483735" r:id="rId3"/>
-    <p:sldLayoutId id="2147483736" r:id="rId4"/>
-    <p:sldLayoutId id="2147483737" r:id="rId5"/>
-    <p:sldLayoutId id="2147483738" r:id="rId6"/>
-    <p:sldLayoutId id="2147483739" r:id="rId7"/>
-    <p:sldLayoutId id="2147483740" r:id="rId8"/>
-    <p:sldLayoutId id="2147483741" r:id="rId9"/>
-    <p:sldLayoutId id="2147483742" r:id="rId10"/>
-    <p:sldLayoutId id="2147483743" r:id="rId11"/>
+    <p:sldLayoutId id="2147483757" r:id="rId1"/>
+    <p:sldLayoutId id="2147483758" r:id="rId2"/>
+    <p:sldLayoutId id="2147483759" r:id="rId3"/>
+    <p:sldLayoutId id="2147483760" r:id="rId4"/>
+    <p:sldLayoutId id="2147483761" r:id="rId5"/>
+    <p:sldLayoutId id="2147483762" r:id="rId6"/>
+    <p:sldLayoutId id="2147483763" r:id="rId7"/>
+    <p:sldLayoutId id="2147483764" r:id="rId8"/>
+    <p:sldLayoutId id="2147483765" r:id="rId9"/>
+    <p:sldLayoutId id="2147483766" r:id="rId10"/>
+    <p:sldLayoutId id="2147483767" r:id="rId11"/>
   </p:sldLayoutIdLst>
   <p:txStyles>
     <p:titleStyle>
-      <a:lvl1pPr algn="l" defTabSz="408097" rtl="0" eaLnBrk="1" latinLnBrk="0" hangingPunct="1">
+      <a:lvl1pPr algn="l" defTabSz="227960" rtl="0" eaLnBrk="1" latinLnBrk="0" hangingPunct="1">
         <a:lnSpc>
           <a:spcPct val="90000"/>
         </a:lnSpc>
@@ -2683,7 +2683,7 @@
           <a:spcPct val="0"/>
         </a:spcBef>
         <a:buNone/>
-        <a:defRPr sz="1964" kern="1200">
+        <a:defRPr sz="1097" kern="1200">
           <a:solidFill>
             <a:schemeClr val="tx1"/>
           </a:solidFill>
@@ -2694,16 +2694,16 @@
       </a:lvl1pPr>
     </p:titleStyle>
     <p:bodyStyle>
-      <a:lvl1pPr marL="102024" indent="-102024" algn="l" defTabSz="408097" rtl="0" eaLnBrk="1" latinLnBrk="0" hangingPunct="1">
+      <a:lvl1pPr marL="56990" indent="-56990" algn="l" defTabSz="227960" rtl="0" eaLnBrk="1" latinLnBrk="0" hangingPunct="1">
         <a:lnSpc>
           <a:spcPct val="90000"/>
         </a:lnSpc>
         <a:spcBef>
-          <a:spcPts val="446"/>
+          <a:spcPts val="249"/>
         </a:spcBef>
         <a:buFont typeface="Arial" panose="020B0604020202020204" pitchFamily="34" charset="0"/>
         <a:buChar char="•"/>
-        <a:defRPr sz="1250" kern="1200">
+        <a:defRPr sz="698" kern="1200">
           <a:solidFill>
             <a:schemeClr val="tx1"/>
           </a:solidFill>
@@ -2712,16 +2712,16 @@
           <a:cs typeface="+mn-cs"/>
         </a:defRPr>
       </a:lvl1pPr>
-      <a:lvl2pPr marL="306073" indent="-102024" algn="l" defTabSz="408097" rtl="0" eaLnBrk="1" latinLnBrk="0" hangingPunct="1">
+      <a:lvl2pPr marL="170970" indent="-56990" algn="l" defTabSz="227960" rtl="0" eaLnBrk="1" latinLnBrk="0" hangingPunct="1">
         <a:lnSpc>
           <a:spcPct val="90000"/>
         </a:lnSpc>
         <a:spcBef>
-          <a:spcPts val="223"/>
+          <a:spcPts val="125"/>
         </a:spcBef>
         <a:buFont typeface="Arial" panose="020B0604020202020204" pitchFamily="34" charset="0"/>
         <a:buChar char="•"/>
-        <a:defRPr sz="1071" kern="1200">
+        <a:defRPr sz="598" kern="1200">
           <a:solidFill>
             <a:schemeClr val="tx1"/>
           </a:solidFill>
@@ -2730,16 +2730,16 @@
           <a:cs typeface="+mn-cs"/>
         </a:defRPr>
       </a:lvl2pPr>
-      <a:lvl3pPr marL="510121" indent="-102024" algn="l" defTabSz="408097" rtl="0" eaLnBrk="1" latinLnBrk="0" hangingPunct="1">
+      <a:lvl3pPr marL="284950" indent="-56990" algn="l" defTabSz="227960" rtl="0" eaLnBrk="1" latinLnBrk="0" hangingPunct="1">
         <a:lnSpc>
           <a:spcPct val="90000"/>
         </a:lnSpc>
         <a:spcBef>
-          <a:spcPts val="223"/>
+          <a:spcPts val="125"/>
         </a:spcBef>
         <a:buFont typeface="Arial" panose="020B0604020202020204" pitchFamily="34" charset="0"/>
         <a:buChar char="•"/>
-        <a:defRPr sz="893" kern="1200">
+        <a:defRPr sz="499" kern="1200">
           <a:solidFill>
             <a:schemeClr val="tx1"/>
           </a:solidFill>
@@ -2748,16 +2748,16 @@
           <a:cs typeface="+mn-cs"/>
         </a:defRPr>
       </a:lvl3pPr>
-      <a:lvl4pPr marL="714169" indent="-102024" algn="l" defTabSz="408097" rtl="0" eaLnBrk="1" latinLnBrk="0" hangingPunct="1">
+      <a:lvl4pPr marL="398930" indent="-56990" algn="l" defTabSz="227960" rtl="0" eaLnBrk="1" latinLnBrk="0" hangingPunct="1">
         <a:lnSpc>
           <a:spcPct val="90000"/>
         </a:lnSpc>
         <a:spcBef>
-          <a:spcPts val="223"/>
+          <a:spcPts val="125"/>
         </a:spcBef>
         <a:buFont typeface="Arial" panose="020B0604020202020204" pitchFamily="34" charset="0"/>
         <a:buChar char="•"/>
-        <a:defRPr sz="803" kern="1200">
+        <a:defRPr sz="449" kern="1200">
           <a:solidFill>
             <a:schemeClr val="tx1"/>
           </a:solidFill>
@@ -2766,16 +2766,16 @@
           <a:cs typeface="+mn-cs"/>
         </a:defRPr>
       </a:lvl4pPr>
-      <a:lvl5pPr marL="918218" indent="-102024" algn="l" defTabSz="408097" rtl="0" eaLnBrk="1" latinLnBrk="0" hangingPunct="1">
+      <a:lvl5pPr marL="512910" indent="-56990" algn="l" defTabSz="227960" rtl="0" eaLnBrk="1" latinLnBrk="0" hangingPunct="1">
         <a:lnSpc>
           <a:spcPct val="90000"/>
         </a:lnSpc>
         <a:spcBef>
-          <a:spcPts val="223"/>
+          <a:spcPts val="125"/>
         </a:spcBef>
         <a:buFont typeface="Arial" panose="020B0604020202020204" pitchFamily="34" charset="0"/>
         <a:buChar char="•"/>
-        <a:defRPr sz="803" kern="1200">
+        <a:defRPr sz="449" kern="1200">
           <a:solidFill>
             <a:schemeClr val="tx1"/>
           </a:solidFill>
@@ -2784,16 +2784,16 @@
           <a:cs typeface="+mn-cs"/>
         </a:defRPr>
       </a:lvl5pPr>
-      <a:lvl6pPr marL="1122266" indent="-102024" algn="l" defTabSz="408097" rtl="0" eaLnBrk="1" latinLnBrk="0" hangingPunct="1">
+      <a:lvl6pPr marL="626890" indent="-56990" algn="l" defTabSz="227960" rtl="0" eaLnBrk="1" latinLnBrk="0" hangingPunct="1">
         <a:lnSpc>
           <a:spcPct val="90000"/>
         </a:lnSpc>
         <a:spcBef>
-          <a:spcPts val="223"/>
+          <a:spcPts val="125"/>
         </a:spcBef>
         <a:buFont typeface="Arial" panose="020B0604020202020204" pitchFamily="34" charset="0"/>
         <a:buChar char="•"/>
-        <a:defRPr sz="803" kern="1200">
+        <a:defRPr sz="449" kern="1200">
           <a:solidFill>
             <a:schemeClr val="tx1"/>
           </a:solidFill>
@@ -2802,16 +2802,16 @@
           <a:cs typeface="+mn-cs"/>
         </a:defRPr>
       </a:lvl6pPr>
-      <a:lvl7pPr marL="1326314" indent="-102024" algn="l" defTabSz="408097" rtl="0" eaLnBrk="1" latinLnBrk="0" hangingPunct="1">
+      <a:lvl7pPr marL="740870" indent="-56990" algn="l" defTabSz="227960" rtl="0" eaLnBrk="1" latinLnBrk="0" hangingPunct="1">
         <a:lnSpc>
           <a:spcPct val="90000"/>
         </a:lnSpc>
         <a:spcBef>
-          <a:spcPts val="223"/>
+          <a:spcPts val="125"/>
         </a:spcBef>
         <a:buFont typeface="Arial" panose="020B0604020202020204" pitchFamily="34" charset="0"/>
         <a:buChar char="•"/>
-        <a:defRPr sz="803" kern="1200">
+        <a:defRPr sz="449" kern="1200">
           <a:solidFill>
             <a:schemeClr val="tx1"/>
           </a:solidFill>
@@ -2820,16 +2820,16 @@
           <a:cs typeface="+mn-cs"/>
         </a:defRPr>
       </a:lvl7pPr>
-      <a:lvl8pPr marL="1530363" indent="-102024" algn="l" defTabSz="408097" rtl="0" eaLnBrk="1" latinLnBrk="0" hangingPunct="1">
+      <a:lvl8pPr marL="854850" indent="-56990" algn="l" defTabSz="227960" rtl="0" eaLnBrk="1" latinLnBrk="0" hangingPunct="1">
         <a:lnSpc>
           <a:spcPct val="90000"/>
         </a:lnSpc>
         <a:spcBef>
-          <a:spcPts val="223"/>
+          <a:spcPts val="125"/>
         </a:spcBef>
         <a:buFont typeface="Arial" panose="020B0604020202020204" pitchFamily="34" charset="0"/>
         <a:buChar char="•"/>
-        <a:defRPr sz="803" kern="1200">
+        <a:defRPr sz="449" kern="1200">
           <a:solidFill>
             <a:schemeClr val="tx1"/>
           </a:solidFill>
@@ -2838,16 +2838,16 @@
           <a:cs typeface="+mn-cs"/>
         </a:defRPr>
       </a:lvl8pPr>
-      <a:lvl9pPr marL="1734411" indent="-102024" algn="l" defTabSz="408097" rtl="0" eaLnBrk="1" latinLnBrk="0" hangingPunct="1">
+      <a:lvl9pPr marL="968830" indent="-56990" algn="l" defTabSz="227960" rtl="0" eaLnBrk="1" latinLnBrk="0" hangingPunct="1">
         <a:lnSpc>
           <a:spcPct val="90000"/>
         </a:lnSpc>
         <a:spcBef>
-          <a:spcPts val="223"/>
+          <a:spcPts val="125"/>
         </a:spcBef>
         <a:buFont typeface="Arial" panose="020B0604020202020204" pitchFamily="34" charset="0"/>
         <a:buChar char="•"/>
-        <a:defRPr sz="803" kern="1200">
+        <a:defRPr sz="449" kern="1200">
           <a:solidFill>
             <a:schemeClr val="tx1"/>
           </a:solidFill>
@@ -2861,8 +2861,8 @@
       <a:defPPr>
         <a:defRPr lang="en-US"/>
       </a:defPPr>
-      <a:lvl1pPr marL="0" algn="l" defTabSz="408097" rtl="0" eaLnBrk="1" latinLnBrk="0" hangingPunct="1">
-        <a:defRPr sz="803" kern="1200">
+      <a:lvl1pPr marL="0" algn="l" defTabSz="227960" rtl="0" eaLnBrk="1" latinLnBrk="0" hangingPunct="1">
+        <a:defRPr sz="449" kern="1200">
           <a:solidFill>
             <a:schemeClr val="tx1"/>
           </a:solidFill>
@@ -2871,8 +2871,8 @@
           <a:cs typeface="+mn-cs"/>
         </a:defRPr>
       </a:lvl1pPr>
-      <a:lvl2pPr marL="204048" algn="l" defTabSz="408097" rtl="0" eaLnBrk="1" latinLnBrk="0" hangingPunct="1">
-        <a:defRPr sz="803" kern="1200">
+      <a:lvl2pPr marL="113980" algn="l" defTabSz="227960" rtl="0" eaLnBrk="1" latinLnBrk="0" hangingPunct="1">
+        <a:defRPr sz="449" kern="1200">
           <a:solidFill>
             <a:schemeClr val="tx1"/>
           </a:solidFill>
@@ -2881,8 +2881,8 @@
           <a:cs typeface="+mn-cs"/>
         </a:defRPr>
       </a:lvl2pPr>
-      <a:lvl3pPr marL="408097" algn="l" defTabSz="408097" rtl="0" eaLnBrk="1" latinLnBrk="0" hangingPunct="1">
-        <a:defRPr sz="803" kern="1200">
+      <a:lvl3pPr marL="227960" algn="l" defTabSz="227960" rtl="0" eaLnBrk="1" latinLnBrk="0" hangingPunct="1">
+        <a:defRPr sz="449" kern="1200">
           <a:solidFill>
             <a:schemeClr val="tx1"/>
           </a:solidFill>
@@ -2891,8 +2891,8 @@
           <a:cs typeface="+mn-cs"/>
         </a:defRPr>
       </a:lvl3pPr>
-      <a:lvl4pPr marL="612145" algn="l" defTabSz="408097" rtl="0" eaLnBrk="1" latinLnBrk="0" hangingPunct="1">
-        <a:defRPr sz="803" kern="1200">
+      <a:lvl4pPr marL="341940" algn="l" defTabSz="227960" rtl="0" eaLnBrk="1" latinLnBrk="0" hangingPunct="1">
+        <a:defRPr sz="449" kern="1200">
           <a:solidFill>
             <a:schemeClr val="tx1"/>
           </a:solidFill>
@@ -2901,8 +2901,8 @@
           <a:cs typeface="+mn-cs"/>
         </a:defRPr>
       </a:lvl4pPr>
-      <a:lvl5pPr marL="816193" algn="l" defTabSz="408097" rtl="0" eaLnBrk="1" latinLnBrk="0" hangingPunct="1">
-        <a:defRPr sz="803" kern="1200">
+      <a:lvl5pPr marL="455920" algn="l" defTabSz="227960" rtl="0" eaLnBrk="1" latinLnBrk="0" hangingPunct="1">
+        <a:defRPr sz="449" kern="1200">
           <a:solidFill>
             <a:schemeClr val="tx1"/>
           </a:solidFill>
@@ -2911,8 +2911,8 @@
           <a:cs typeface="+mn-cs"/>
         </a:defRPr>
       </a:lvl5pPr>
-      <a:lvl6pPr marL="1020242" algn="l" defTabSz="408097" rtl="0" eaLnBrk="1" latinLnBrk="0" hangingPunct="1">
-        <a:defRPr sz="803" kern="1200">
+      <a:lvl6pPr marL="569900" algn="l" defTabSz="227960" rtl="0" eaLnBrk="1" latinLnBrk="0" hangingPunct="1">
+        <a:defRPr sz="449" kern="1200">
           <a:solidFill>
             <a:schemeClr val="tx1"/>
           </a:solidFill>
@@ -2921,8 +2921,8 @@
           <a:cs typeface="+mn-cs"/>
         </a:defRPr>
       </a:lvl6pPr>
-      <a:lvl7pPr marL="1224290" algn="l" defTabSz="408097" rtl="0" eaLnBrk="1" latinLnBrk="0" hangingPunct="1">
-        <a:defRPr sz="803" kern="1200">
+      <a:lvl7pPr marL="683880" algn="l" defTabSz="227960" rtl="0" eaLnBrk="1" latinLnBrk="0" hangingPunct="1">
+        <a:defRPr sz="449" kern="1200">
           <a:solidFill>
             <a:schemeClr val="tx1"/>
           </a:solidFill>
@@ -2931,8 +2931,8 @@
           <a:cs typeface="+mn-cs"/>
         </a:defRPr>
       </a:lvl7pPr>
-      <a:lvl8pPr marL="1428339" algn="l" defTabSz="408097" rtl="0" eaLnBrk="1" latinLnBrk="0" hangingPunct="1">
-        <a:defRPr sz="803" kern="1200">
+      <a:lvl8pPr marL="797860" algn="l" defTabSz="227960" rtl="0" eaLnBrk="1" latinLnBrk="0" hangingPunct="1">
+        <a:defRPr sz="449" kern="1200">
           <a:solidFill>
             <a:schemeClr val="tx1"/>
           </a:solidFill>
@@ -2941,8 +2941,8 @@
           <a:cs typeface="+mn-cs"/>
         </a:defRPr>
       </a:lvl8pPr>
-      <a:lvl9pPr marL="1632387" algn="l" defTabSz="408097" rtl="0" eaLnBrk="1" latinLnBrk="0" hangingPunct="1">
-        <a:defRPr sz="803" kern="1200">
+      <a:lvl9pPr marL="911840" algn="l" defTabSz="227960" rtl="0" eaLnBrk="1" latinLnBrk="0" hangingPunct="1">
+        <a:defRPr sz="449" kern="1200">
           <a:solidFill>
             <a:schemeClr val="tx1"/>
           </a:solidFill>
@@ -2961,7 +2961,13 @@
   <p:cSld>
     <p:spTree>
       <p:nvGrpSpPr>
-        <p:cNvPr id="1" name=""/>
+        <p:cNvPr id="1" name="">
+          <a:extLst>
+            <a:ext uri="{FF2B5EF4-FFF2-40B4-BE49-F238E27FC236}">
+              <a16:creationId xmlns:a16="http://schemas.microsoft.com/office/drawing/2014/main" id="{42E2D679-94E5-9B8F-7B6E-20A2B98F8CD8}"/>
+            </a:ext>
+          </a:extLst>
+        </p:cNvPr>
         <p:cNvGrpSpPr/>
         <p:nvPr/>
       </p:nvGrpSpPr>
@@ -2975,10 +2981,10 @@
       </p:grpSpPr>
       <p:pic>
         <p:nvPicPr>
-          <p:cNvPr id="3" name="Graphic 2">
+          <p:cNvPr id="13" name="Graphic 12">
             <a:extLst>
               <a:ext uri="{FF2B5EF4-FFF2-40B4-BE49-F238E27FC236}">
-                <a16:creationId xmlns:a16="http://schemas.microsoft.com/office/drawing/2014/main" id="{6E0E4E6A-E781-A0C6-1DC1-2EE6B1CDBC7E}"/>
+                <a16:creationId xmlns:a16="http://schemas.microsoft.com/office/drawing/2014/main" id="{EFDD7686-13EF-54AE-C6B4-572D6CEBF56D}"/>
               </a:ext>
             </a:extLst>
           </p:cNvPr>
@@ -3001,8 +3007,8 @@
         </p:blipFill>
         <p:spPr>
           <a:xfrm>
-            <a:off x="427121" y="0"/>
-            <a:ext cx="2413945" cy="3060700"/>
+            <a:off x="4651018" y="-262"/>
+            <a:ext cx="1857981" cy="1710000"/>
           </a:xfrm>
           <a:prstGeom prst="rect">
             <a:avLst/>
@@ -3011,10 +3017,10 @@
       </p:pic>
       <p:pic>
         <p:nvPicPr>
-          <p:cNvPr id="5" name="Graphic 4">
+          <p:cNvPr id="21" name="Graphic 20">
             <a:extLst>
               <a:ext uri="{FF2B5EF4-FFF2-40B4-BE49-F238E27FC236}">
-                <a16:creationId xmlns:a16="http://schemas.microsoft.com/office/drawing/2014/main" id="{9949CBC9-ED55-E947-7FD6-F6A9EF4AFC4B}"/>
+                <a16:creationId xmlns:a16="http://schemas.microsoft.com/office/drawing/2014/main" id="{6BC84858-A1B9-6820-9BE6-29B0DBAC1F6E}"/>
               </a:ext>
             </a:extLst>
           </p:cNvPr>
@@ -3037,8 +3043,8 @@
         </p:blipFill>
         <p:spPr>
           <a:xfrm>
-            <a:off x="3033717" y="356672"/>
-            <a:ext cx="3554408" cy="2347356"/>
+            <a:off x="79126" y="0"/>
+            <a:ext cx="4471229" cy="1710000"/>
           </a:xfrm>
           <a:prstGeom prst="rect">
             <a:avLst/>
@@ -3047,10 +3053,10 @@
       </p:pic>
       <p:sp>
         <p:nvSpPr>
-          <p:cNvPr id="6" name="TextBox 5">
+          <p:cNvPr id="22" name="TextBox 21">
             <a:extLst>
               <a:ext uri="{FF2B5EF4-FFF2-40B4-BE49-F238E27FC236}">
-                <a16:creationId xmlns:a16="http://schemas.microsoft.com/office/drawing/2014/main" id="{1A2E934C-0452-D74D-60C8-C2B4FA03C914}"/>
+                <a16:creationId xmlns:a16="http://schemas.microsoft.com/office/drawing/2014/main" id="{E2FCDC3B-C9BB-A2AD-FD9F-8646A25BE396}"/>
               </a:ext>
             </a:extLst>
           </p:cNvPr>
@@ -3059,7 +3065,7 @@
         </p:nvSpPr>
         <p:spPr>
           <a:xfrm>
-            <a:off x="124504" y="0"/>
+            <a:off x="59187" y="16470"/>
             <a:ext cx="242374" cy="215444"/>
           </a:xfrm>
           <a:prstGeom prst="rect">
@@ -3085,10 +3091,10 @@
       </p:sp>
       <p:sp>
         <p:nvSpPr>
-          <p:cNvPr id="7" name="TextBox 6">
+          <p:cNvPr id="23" name="TextBox 22">
             <a:extLst>
               <a:ext uri="{FF2B5EF4-FFF2-40B4-BE49-F238E27FC236}">
-                <a16:creationId xmlns:a16="http://schemas.microsoft.com/office/drawing/2014/main" id="{B190E259-EB42-4338-F45B-8E3D8C861305}"/>
+                <a16:creationId xmlns:a16="http://schemas.microsoft.com/office/drawing/2014/main" id="{751EA6F9-003A-3B7D-8F82-7ABCC356845E}"/>
               </a:ext>
             </a:extLst>
           </p:cNvPr>
@@ -3097,7 +3103,7 @@
         </p:nvSpPr>
         <p:spPr>
           <a:xfrm>
-            <a:off x="2912530" y="-4275"/>
+            <a:off x="4526720" y="12195"/>
             <a:ext cx="247184" cy="215444"/>
           </a:xfrm>
           <a:prstGeom prst="rect">
@@ -3124,7 +3130,7 @@
     </p:spTree>
     <p:extLst>
       <p:ext uri="{BB962C8B-B14F-4D97-AF65-F5344CB8AC3E}">
-        <p14:creationId xmlns:p14="http://schemas.microsoft.com/office/powerpoint/2010/main" val="2500203499"/>
+        <p14:creationId xmlns:p14="http://schemas.microsoft.com/office/powerpoint/2010/main" val="1857300883"/>
       </p:ext>
     </p:extLst>
   </p:cSld>

</xml_diff>